<commit_message>
Added Course Materials - Day 9
</commit_message>
<xml_diff>
--- a/2. Core Java/Day 9/Slides/5. Repositories/repositories-slides.pptx
+++ b/2. Core Java/Day 9/Slides/5. Repositories/repositories-slides.pptx
@@ -1958,7 +1958,7 @@
           </a:bodyPr>
           <a:lstStyle/>
           <a:p>
-            <a:pPr marR="7992110" algn="r">
+            <a:pPr marR="7992110" algn="l">
               <a:lnSpc>
                 <a:spcPct val="100000"/>
               </a:lnSpc>
@@ -1992,7 +1992,7 @@
             </a:endParaRPr>
           </a:p>
           <a:p>
-            <a:pPr marR="7976870" algn="r">
+            <a:pPr marR="7976870" algn="l">
               <a:lnSpc>
                 <a:spcPct val="100000"/>
               </a:lnSpc>
@@ -2616,7 +2616,7 @@
             </a:endParaRPr>
           </a:p>
           <a:p>
-            <a:pPr marR="7740650" algn="r">
+            <a:pPr marR="7740650" algn="l">
               <a:lnSpc>
                 <a:spcPct val="100000"/>
               </a:lnSpc>
@@ -2660,7 +2660,7 @@
             </a:endParaRPr>
           </a:p>
           <a:p>
-            <a:pPr marR="7755890" algn="r">
+            <a:pPr marR="7755890" algn="l">
               <a:lnSpc>
                 <a:spcPct val="100000"/>
               </a:lnSpc>
@@ -2704,7 +2704,7 @@
             </a:endParaRPr>
           </a:p>
           <a:p>
-            <a:pPr marR="7771130" algn="r">
+            <a:pPr marR="7771130" algn="l">
               <a:lnSpc>
                 <a:spcPct val="100000"/>
               </a:lnSpc>

</xml_diff>